<commit_message>
Minor changes to several items
Fixing of spelling errors, etc. in several items
</commit_message>
<xml_diff>
--- a/Chap/Start/Presentations/HW-Intro2022.pptx
+++ b/Chap/Start/Presentations/HW-Intro2022.pptx
@@ -130,6 +130,11 @@
       </a:defRPr>
     </a:lvl9pPr>
   </p:defaultTextStyle>
+  <p:extLst>
+    <p:ext uri="{EFAFB233-063F-42B5-8137-9DF3F51BA10A}">
+      <p15:sldGuideLst xmlns:p15="http://schemas.microsoft.com/office/powerpoint/2012/main"/>
+    </p:ext>
+  </p:extLst>
 </p:presentation>
 </file>
 
@@ -280,7 +285,7 @@
           <a:p>
             <a:fld id="{8DF2E48B-4DCD-4B94-8BF7-6FE139A3DDCC}" type="datetimeFigureOut">
               <a:rPr lang="da-DK" smtClean="0"/>
-              <a:t>12-08-2022</a:t>
+              <a:t>04-09-2022</a:t>
             </a:fld>
             <a:endParaRPr lang="da-DK"/>
           </a:p>
@@ -478,7 +483,7 @@
           <a:p>
             <a:fld id="{8DF2E48B-4DCD-4B94-8BF7-6FE139A3DDCC}" type="datetimeFigureOut">
               <a:rPr lang="da-DK" smtClean="0"/>
-              <a:t>12-08-2022</a:t>
+              <a:t>04-09-2022</a:t>
             </a:fld>
             <a:endParaRPr lang="da-DK"/>
           </a:p>
@@ -686,7 +691,7 @@
           <a:p>
             <a:fld id="{8DF2E48B-4DCD-4B94-8BF7-6FE139A3DDCC}" type="datetimeFigureOut">
               <a:rPr lang="da-DK" smtClean="0"/>
-              <a:t>12-08-2022</a:t>
+              <a:t>04-09-2022</a:t>
             </a:fld>
             <a:endParaRPr lang="da-DK"/>
           </a:p>
@@ -884,7 +889,7 @@
           <a:p>
             <a:fld id="{8DF2E48B-4DCD-4B94-8BF7-6FE139A3DDCC}" type="datetimeFigureOut">
               <a:rPr lang="da-DK" smtClean="0"/>
-              <a:t>12-08-2022</a:t>
+              <a:t>04-09-2022</a:t>
             </a:fld>
             <a:endParaRPr lang="da-DK"/>
           </a:p>
@@ -1159,7 +1164,7 @@
           <a:p>
             <a:fld id="{8DF2E48B-4DCD-4B94-8BF7-6FE139A3DDCC}" type="datetimeFigureOut">
               <a:rPr lang="da-DK" smtClean="0"/>
-              <a:t>12-08-2022</a:t>
+              <a:t>04-09-2022</a:t>
             </a:fld>
             <a:endParaRPr lang="da-DK"/>
           </a:p>
@@ -1424,7 +1429,7 @@
           <a:p>
             <a:fld id="{8DF2E48B-4DCD-4B94-8BF7-6FE139A3DDCC}" type="datetimeFigureOut">
               <a:rPr lang="da-DK" smtClean="0"/>
-              <a:t>12-08-2022</a:t>
+              <a:t>04-09-2022</a:t>
             </a:fld>
             <a:endParaRPr lang="da-DK"/>
           </a:p>
@@ -1836,7 +1841,7 @@
           <a:p>
             <a:fld id="{8DF2E48B-4DCD-4B94-8BF7-6FE139A3DDCC}" type="datetimeFigureOut">
               <a:rPr lang="da-DK" smtClean="0"/>
-              <a:t>12-08-2022</a:t>
+              <a:t>04-09-2022</a:t>
             </a:fld>
             <a:endParaRPr lang="da-DK"/>
           </a:p>
@@ -1977,7 +1982,7 @@
           <a:p>
             <a:fld id="{8DF2E48B-4DCD-4B94-8BF7-6FE139A3DDCC}" type="datetimeFigureOut">
               <a:rPr lang="da-DK" smtClean="0"/>
-              <a:t>12-08-2022</a:t>
+              <a:t>04-09-2022</a:t>
             </a:fld>
             <a:endParaRPr lang="da-DK"/>
           </a:p>
@@ -2090,7 +2095,7 @@
           <a:p>
             <a:fld id="{8DF2E48B-4DCD-4B94-8BF7-6FE139A3DDCC}" type="datetimeFigureOut">
               <a:rPr lang="da-DK" smtClean="0"/>
-              <a:t>12-08-2022</a:t>
+              <a:t>04-09-2022</a:t>
             </a:fld>
             <a:endParaRPr lang="da-DK"/>
           </a:p>
@@ -2401,7 +2406,7 @@
           <a:p>
             <a:fld id="{8DF2E48B-4DCD-4B94-8BF7-6FE139A3DDCC}" type="datetimeFigureOut">
               <a:rPr lang="da-DK" smtClean="0"/>
-              <a:t>12-08-2022</a:t>
+              <a:t>04-09-2022</a:t>
             </a:fld>
             <a:endParaRPr lang="da-DK"/>
           </a:p>
@@ -2689,7 +2694,7 @@
           <a:p>
             <a:fld id="{8DF2E48B-4DCD-4B94-8BF7-6FE139A3DDCC}" type="datetimeFigureOut">
               <a:rPr lang="da-DK" smtClean="0"/>
-              <a:t>12-08-2022</a:t>
+              <a:t>04-09-2022</a:t>
             </a:fld>
             <a:endParaRPr lang="da-DK"/>
           </a:p>
@@ -2930,7 +2935,7 @@
           <a:p>
             <a:fld id="{8DF2E48B-4DCD-4B94-8BF7-6FE139A3DDCC}" type="datetimeFigureOut">
               <a:rPr lang="da-DK" smtClean="0"/>
-              <a:t>12-08-2022</a:t>
+              <a:t>04-09-2022</a:t>
             </a:fld>
             <a:endParaRPr lang="da-DK"/>
           </a:p>
@@ -3477,13 +3482,13 @@
   <p:clrMapOvr>
     <a:masterClrMapping/>
   </p:clrMapOvr>
-  <mc:AlternateContent xmlns:mc="http://schemas.openxmlformats.org/markup-compatibility/2006">
-    <mc:Choice xmlns:p14="http://schemas.microsoft.com/office/powerpoint/2010/main" Requires="p14">
+  <mc:AlternateContent xmlns:mc="http://schemas.openxmlformats.org/markup-compatibility/2006" xmlns:p14="http://schemas.microsoft.com/office/powerpoint/2010/main">
+    <mc:Choice Requires="p14">
       <p:transition spd="med" p14:dur="700">
         <p:fade/>
       </p:transition>
     </mc:Choice>
-    <mc:Fallback>
+    <mc:Fallback xmlns="">
       <p:transition spd="med">
         <p:fade/>
       </p:transition>
@@ -4145,13 +4150,13 @@
   <p:clrMapOvr>
     <a:masterClrMapping/>
   </p:clrMapOvr>
-  <mc:AlternateContent xmlns:mc="http://schemas.openxmlformats.org/markup-compatibility/2006">
-    <mc:Choice xmlns:p14="http://schemas.microsoft.com/office/powerpoint/2010/main" Requires="p14">
+  <mc:AlternateContent xmlns:mc="http://schemas.openxmlformats.org/markup-compatibility/2006" xmlns:p14="http://schemas.microsoft.com/office/powerpoint/2010/main">
+    <mc:Choice Requires="p14">
       <p:transition spd="med" p14:dur="700">
         <p:fade/>
       </p:transition>
     </mc:Choice>
-    <mc:Fallback>
+    <mc:Fallback xmlns="">
       <p:transition spd="med">
         <p:fade/>
       </p:transition>
@@ -4717,13 +4722,13 @@
   <p:clrMapOvr>
     <a:masterClrMapping/>
   </p:clrMapOvr>
-  <mc:AlternateContent xmlns:mc="http://schemas.openxmlformats.org/markup-compatibility/2006">
-    <mc:Choice xmlns:p14="http://schemas.microsoft.com/office/powerpoint/2010/main" Requires="p14">
+  <mc:AlternateContent xmlns:mc="http://schemas.openxmlformats.org/markup-compatibility/2006" xmlns:p14="http://schemas.microsoft.com/office/powerpoint/2010/main">
+    <mc:Choice Requires="p14">
       <p:transition spd="med" p14:dur="700">
         <p:fade/>
       </p:transition>
     </mc:Choice>
-    <mc:Fallback>
+    <mc:Fallback xmlns="">
       <p:transition spd="med">
         <p:fade/>
       </p:transition>
@@ -6268,13 +6273,13 @@
   <p:clrMapOvr>
     <a:masterClrMapping/>
   </p:clrMapOvr>
-  <mc:AlternateContent xmlns:mc="http://schemas.openxmlformats.org/markup-compatibility/2006">
-    <mc:Choice xmlns:p14="http://schemas.microsoft.com/office/powerpoint/2010/main" Requires="p14">
+  <mc:AlternateContent xmlns:mc="http://schemas.openxmlformats.org/markup-compatibility/2006" xmlns:p14="http://schemas.microsoft.com/office/powerpoint/2010/main">
+    <mc:Choice Requires="p14">
       <p:transition spd="med" p14:dur="700">
         <p:fade/>
       </p:transition>
     </mc:Choice>
-    <mc:Fallback>
+    <mc:Fallback xmlns="">
       <p:transition spd="med">
         <p:fade/>
       </p:transition>
@@ -6910,13 +6915,13 @@
   <p:clrMapOvr>
     <a:masterClrMapping/>
   </p:clrMapOvr>
-  <mc:AlternateContent xmlns:mc="http://schemas.openxmlformats.org/markup-compatibility/2006">
-    <mc:Choice xmlns:p14="http://schemas.microsoft.com/office/powerpoint/2010/main" Requires="p14">
+  <mc:AlternateContent xmlns:mc="http://schemas.openxmlformats.org/markup-compatibility/2006" xmlns:p14="http://schemas.microsoft.com/office/powerpoint/2010/main">
+    <mc:Choice Requires="p14">
       <p:transition spd="med" p14:dur="700">
         <p:fade/>
       </p:transition>
     </mc:Choice>
-    <mc:Fallback>
+    <mc:Fallback xmlns="">
       <p:transition spd="med">
         <p:fade/>
       </p:transition>
@@ -7545,13 +7550,13 @@
   <p:clrMapOvr>
     <a:masterClrMapping/>
   </p:clrMapOvr>
-  <mc:AlternateContent xmlns:mc="http://schemas.openxmlformats.org/markup-compatibility/2006">
-    <mc:Choice xmlns:p14="http://schemas.microsoft.com/office/powerpoint/2010/main" Requires="p14">
+  <mc:AlternateContent xmlns:mc="http://schemas.openxmlformats.org/markup-compatibility/2006" xmlns:p14="http://schemas.microsoft.com/office/powerpoint/2010/main">
+    <mc:Choice Requires="p14">
       <p:transition spd="med" p14:dur="700">
         <p:fade/>
       </p:transition>
     </mc:Choice>
-    <mc:Fallback>
+    <mc:Fallback xmlns="">
       <p:transition spd="med">
         <p:fade/>
       </p:transition>
@@ -7982,33 +7987,87 @@
           <a:lstStyle/>
           <a:p>
             <a:r>
-              <a:rPr lang="da-DK" sz="2200"/>
+              <a:rPr lang="da-DK" sz="2200" dirty="0"/>
               <a:t>USA, 1945 (WW2)</a:t>
             </a:r>
           </a:p>
           <a:p>
             <a:r>
-              <a:rPr lang="da-DK" sz="2200"/>
+              <a:rPr lang="da-DK" sz="2200" dirty="0"/>
               <a:t>30 tons</a:t>
             </a:r>
           </a:p>
           <a:p>
             <a:r>
-              <a:rPr lang="da-DK" sz="2200"/>
-              <a:t>About 18.00 transistors (radio tubes)</a:t>
-            </a:r>
-          </a:p>
-          <a:p>
-            <a:r>
-              <a:rPr lang="da-DK" sz="2200"/>
-              <a:t>Calculation of projectile trajectories</a:t>
-            </a:r>
-          </a:p>
-          <a:p>
-            <a:r>
-              <a:rPr lang="da-DK" sz="2200"/>
-              <a:t>Similar computers being built in other countries</a:t>
-            </a:r>
+              <a:rPr lang="da-DK" sz="2200" dirty="0" err="1"/>
+              <a:t>About</a:t>
+            </a:r>
+            <a:r>
+              <a:rPr lang="da-DK" sz="2200" dirty="0"/>
+              <a:t> 18.000 transistors (radio tubes)</a:t>
+            </a:r>
+          </a:p>
+          <a:p>
+            <a:r>
+              <a:rPr lang="da-DK" sz="2200" dirty="0" err="1"/>
+              <a:t>Calculation</a:t>
+            </a:r>
+            <a:r>
+              <a:rPr lang="da-DK" sz="2200" dirty="0"/>
+              <a:t> of </a:t>
+            </a:r>
+            <a:r>
+              <a:rPr lang="da-DK" sz="2200" dirty="0" err="1"/>
+              <a:t>projectile</a:t>
+            </a:r>
+            <a:r>
+              <a:rPr lang="da-DK" sz="2200" dirty="0"/>
+              <a:t> </a:t>
+            </a:r>
+            <a:r>
+              <a:rPr lang="da-DK" sz="2200" dirty="0" err="1"/>
+              <a:t>trajectories</a:t>
+            </a:r>
+            <a:endParaRPr lang="da-DK" sz="2200" dirty="0"/>
+          </a:p>
+          <a:p>
+            <a:r>
+              <a:rPr lang="da-DK" sz="2200" dirty="0" err="1"/>
+              <a:t>Similar</a:t>
+            </a:r>
+            <a:r>
+              <a:rPr lang="da-DK" sz="2200" dirty="0"/>
+              <a:t> computers </a:t>
+            </a:r>
+            <a:r>
+              <a:rPr lang="da-DK" sz="2200" dirty="0" err="1"/>
+              <a:t>being</a:t>
+            </a:r>
+            <a:r>
+              <a:rPr lang="da-DK" sz="2200" dirty="0"/>
+              <a:t> </a:t>
+            </a:r>
+            <a:r>
+              <a:rPr lang="da-DK" sz="2200" dirty="0" err="1"/>
+              <a:t>built</a:t>
+            </a:r>
+            <a:r>
+              <a:rPr lang="da-DK" sz="2200" dirty="0"/>
+              <a:t> in </a:t>
+            </a:r>
+            <a:r>
+              <a:rPr lang="da-DK" sz="2200" dirty="0" err="1"/>
+              <a:t>other</a:t>
+            </a:r>
+            <a:r>
+              <a:rPr lang="da-DK" sz="2200" dirty="0"/>
+              <a:t> </a:t>
+            </a:r>
+            <a:r>
+              <a:rPr lang="da-DK" sz="2200" dirty="0" err="1"/>
+              <a:t>countries</a:t>
+            </a:r>
+            <a:endParaRPr lang="da-DK" sz="2200" dirty="0"/>
           </a:p>
         </p:txBody>
       </p:sp>
@@ -8078,13 +8137,13 @@
   <p:clrMapOvr>
     <a:masterClrMapping/>
   </p:clrMapOvr>
-  <mc:AlternateContent xmlns:mc="http://schemas.openxmlformats.org/markup-compatibility/2006">
-    <mc:Choice xmlns:p14="http://schemas.microsoft.com/office/powerpoint/2010/main" Requires="p14">
+  <mc:AlternateContent xmlns:mc="http://schemas.openxmlformats.org/markup-compatibility/2006" xmlns:p14="http://schemas.microsoft.com/office/powerpoint/2010/main">
+    <mc:Choice Requires="p14">
       <p:transition spd="med" p14:dur="700">
         <p:fade/>
       </p:transition>
     </mc:Choice>
-    <mc:Fallback>
+    <mc:Fallback xmlns="">
       <p:transition spd="med">
         <p:fade/>
       </p:transition>
@@ -8696,13 +8755,13 @@
   <p:clrMapOvr>
     <a:masterClrMapping/>
   </p:clrMapOvr>
-  <mc:AlternateContent xmlns:mc="http://schemas.openxmlformats.org/markup-compatibility/2006">
-    <mc:Choice xmlns:p14="http://schemas.microsoft.com/office/powerpoint/2010/main" Requires="p14">
+  <mc:AlternateContent xmlns:mc="http://schemas.openxmlformats.org/markup-compatibility/2006" xmlns:p14="http://schemas.microsoft.com/office/powerpoint/2010/main">
+    <mc:Choice Requires="p14">
       <p:transition spd="med" p14:dur="700">
         <p:fade/>
       </p:transition>
     </mc:Choice>
-    <mc:Fallback>
+    <mc:Fallback xmlns="">
       <p:transition spd="med">
         <p:fade/>
       </p:transition>
@@ -9394,13 +9453,13 @@
   <p:clrMapOvr>
     <a:masterClrMapping/>
   </p:clrMapOvr>
-  <mc:AlternateContent xmlns:mc="http://schemas.openxmlformats.org/markup-compatibility/2006">
-    <mc:Choice xmlns:p14="http://schemas.microsoft.com/office/powerpoint/2010/main" Requires="p14">
+  <mc:AlternateContent xmlns:mc="http://schemas.openxmlformats.org/markup-compatibility/2006" xmlns:p14="http://schemas.microsoft.com/office/powerpoint/2010/main">
+    <mc:Choice Requires="p14">
       <p:transition spd="med" p14:dur="700">
         <p:fade/>
       </p:transition>
     </mc:Choice>
-    <mc:Fallback>
+    <mc:Fallback xmlns="">
       <p:transition spd="med">
         <p:fade/>
       </p:transition>
@@ -9474,7 +9533,7 @@
           <p:nvPr>
             <p:extLst>
               <p:ext uri="{D42A27DB-BD31-4B8C-83A1-F6EECF244321}">
-                <p14:modId xmlns:p14="http://schemas.microsoft.com/office/powerpoint/2010/main" val="2947872183"/>
+                <p14:modId xmlns:p14="http://schemas.microsoft.com/office/powerpoint/2010/main" val="2570171503"/>
               </p:ext>
             </p:extLst>
           </p:nvPr>
@@ -9840,7 +9899,7 @@
                             <a:schemeClr val="tx1"/>
                           </a:solidFill>
                         </a:rPr>
-                        <a:t>booshelf</a:t>
+                        <a:t>bookshelf</a:t>
                       </a:r>
                       <a:endParaRPr lang="da-DK" sz="2400" b="0" dirty="0">
                         <a:solidFill>
@@ -10187,13 +10246,13 @@
   <p:clrMapOvr>
     <a:masterClrMapping/>
   </p:clrMapOvr>
-  <mc:AlternateContent xmlns:mc="http://schemas.openxmlformats.org/markup-compatibility/2006">
-    <mc:Choice xmlns:p14="http://schemas.microsoft.com/office/powerpoint/2010/main" Requires="p14">
+  <mc:AlternateContent xmlns:mc="http://schemas.openxmlformats.org/markup-compatibility/2006" xmlns:p14="http://schemas.microsoft.com/office/powerpoint/2010/main">
+    <mc:Choice Requires="p14">
       <p:transition spd="med" p14:dur="700">
         <p:fade/>
       </p:transition>
     </mc:Choice>
-    <mc:Fallback>
+    <mc:Fallback xmlns="">
       <p:transition spd="med">
         <p:fade/>
       </p:transition>
@@ -10799,13 +10858,13 @@
   <p:clrMapOvr>
     <a:masterClrMapping/>
   </p:clrMapOvr>
-  <mc:AlternateContent xmlns:mc="http://schemas.openxmlformats.org/markup-compatibility/2006">
-    <mc:Choice xmlns:p14="http://schemas.microsoft.com/office/powerpoint/2010/main" Requires="p14">
+  <mc:AlternateContent xmlns:mc="http://schemas.openxmlformats.org/markup-compatibility/2006" xmlns:p14="http://schemas.microsoft.com/office/powerpoint/2010/main">
+    <mc:Choice Requires="p14">
       <p:transition spd="med" p14:dur="700">
         <p:fade/>
       </p:transition>
     </mc:Choice>
-    <mc:Fallback>
+    <mc:Fallback xmlns="">
       <p:transition spd="med">
         <p:fade/>
       </p:transition>
@@ -11358,13 +11417,13 @@
   <p:clrMapOvr>
     <a:masterClrMapping/>
   </p:clrMapOvr>
-  <mc:AlternateContent xmlns:mc="http://schemas.openxmlformats.org/markup-compatibility/2006">
-    <mc:Choice xmlns:p14="http://schemas.microsoft.com/office/powerpoint/2010/main" Requires="p14">
+  <mc:AlternateContent xmlns:mc="http://schemas.openxmlformats.org/markup-compatibility/2006" xmlns:p14="http://schemas.microsoft.com/office/powerpoint/2010/main">
+    <mc:Choice Requires="p14">
       <p:transition spd="med" p14:dur="700">
         <p:fade/>
       </p:transition>
     </mc:Choice>
-    <mc:Fallback>
+    <mc:Fallback xmlns="">
       <p:transition spd="med">
         <p:fade/>
       </p:transition>
@@ -11432,8 +11491,8 @@
         </p:nvSpPr>
         <p:spPr>
           <a:xfrm>
-            <a:off x="1947424" y="2456892"/>
-            <a:ext cx="1512168" cy="1872208"/>
+            <a:off x="1200002" y="1896324"/>
+            <a:ext cx="2331598" cy="2882409"/>
           </a:xfrm>
           <a:prstGeom prst="rect">
             <a:avLst/>
@@ -11461,7 +11520,7 @@
           <a:p>
             <a:pPr algn="ctr"/>
             <a:r>
-              <a:rPr lang="da-DK" sz="3200" dirty="0"/>
+              <a:rPr lang="da-DK" sz="4800" dirty="0"/>
               <a:t>CPU</a:t>
             </a:r>
           </a:p>
@@ -11481,8 +11540,8 @@
         </p:nvSpPr>
         <p:spPr>
           <a:xfrm>
-            <a:off x="4539712" y="2492896"/>
-            <a:ext cx="1656184" cy="1872208"/>
+            <a:off x="4523294" y="1896329"/>
+            <a:ext cx="2282507" cy="2882404"/>
           </a:xfrm>
           <a:prstGeom prst="rect">
             <a:avLst/>
@@ -11515,7 +11574,7 @@
           <a:p>
             <a:pPr algn="ctr"/>
             <a:r>
-              <a:rPr lang="da-DK" sz="3200" dirty="0"/>
+              <a:rPr lang="da-DK" sz="4800" dirty="0"/>
               <a:t>RAM</a:t>
             </a:r>
           </a:p>
@@ -11535,8 +11594,8 @@
         </p:nvSpPr>
         <p:spPr>
           <a:xfrm>
-            <a:off x="7384028" y="2489667"/>
-            <a:ext cx="1656184" cy="1872208"/>
+            <a:off x="7797495" y="1896322"/>
+            <a:ext cx="2331598" cy="2882383"/>
           </a:xfrm>
           <a:prstGeom prst="rect">
             <a:avLst/>
@@ -11569,7 +11628,7 @@
           <a:p>
             <a:pPr algn="ctr"/>
             <a:r>
-              <a:rPr lang="da-DK" sz="3200" dirty="0"/>
+              <a:rPr lang="da-DK" sz="4800" dirty="0"/>
               <a:t>Storage</a:t>
             </a:r>
           </a:p>
@@ -11589,7 +11648,7 @@
         </p:nvCxnSpPr>
         <p:spPr>
           <a:xfrm>
-            <a:off x="3603608" y="3425771"/>
+            <a:off x="3595210" y="3333585"/>
             <a:ext cx="864096" cy="0"/>
           </a:xfrm>
           <a:prstGeom prst="straightConnector1">
@@ -11629,7 +11688,7 @@
         </p:nvCxnSpPr>
         <p:spPr>
           <a:xfrm>
-            <a:off x="6339912" y="3437586"/>
+            <a:off x="6881716" y="3338909"/>
             <a:ext cx="864096" cy="0"/>
           </a:xfrm>
           <a:prstGeom prst="straightConnector1">
@@ -11665,13 +11724,13 @@
   <p:clrMapOvr>
     <a:masterClrMapping/>
   </p:clrMapOvr>
-  <mc:AlternateContent xmlns:mc="http://schemas.openxmlformats.org/markup-compatibility/2006">
-    <mc:Choice xmlns:p14="http://schemas.microsoft.com/office/powerpoint/2010/main" Requires="p14">
+  <mc:AlternateContent xmlns:mc="http://schemas.openxmlformats.org/markup-compatibility/2006" xmlns:p14="http://schemas.microsoft.com/office/powerpoint/2010/main">
+    <mc:Choice Requires="p14">
       <p:transition spd="med" p14:dur="700">
         <p:fade/>
       </p:transition>
     </mc:Choice>
-    <mc:Fallback>
+    <mc:Fallback xmlns="">
       <p:transition spd="med">
         <p:fade/>
       </p:transition>
@@ -12372,13 +12431,13 @@
   <p:clrMapOvr>
     <a:masterClrMapping/>
   </p:clrMapOvr>
-  <mc:AlternateContent xmlns:mc="http://schemas.openxmlformats.org/markup-compatibility/2006">
-    <mc:Choice xmlns:p14="http://schemas.microsoft.com/office/powerpoint/2010/main" Requires="p14">
+  <mc:AlternateContent xmlns:mc="http://schemas.openxmlformats.org/markup-compatibility/2006" xmlns:p14="http://schemas.microsoft.com/office/powerpoint/2010/main">
+    <mc:Choice Requires="p14">
       <p:transition spd="med" p14:dur="700">
         <p:fade/>
       </p:transition>
     </mc:Choice>
-    <mc:Fallback>
+    <mc:Fallback xmlns="">
       <p:transition spd="med">
         <p:fade/>
       </p:transition>
@@ -13027,13 +13086,13 @@
   <p:clrMapOvr>
     <a:masterClrMapping/>
   </p:clrMapOvr>
-  <mc:AlternateContent xmlns:mc="http://schemas.openxmlformats.org/markup-compatibility/2006">
-    <mc:Choice xmlns:p14="http://schemas.microsoft.com/office/powerpoint/2010/main" Requires="p14">
+  <mc:AlternateContent xmlns:mc="http://schemas.openxmlformats.org/markup-compatibility/2006" xmlns:p14="http://schemas.microsoft.com/office/powerpoint/2010/main">
+    <mc:Choice Requires="p14">
       <p:transition spd="med" p14:dur="700">
         <p:fade/>
       </p:transition>
     </mc:Choice>
-    <mc:Fallback>
+    <mc:Fallback xmlns="">
       <p:transition spd="med">
         <p:fade/>
       </p:transition>
@@ -13662,7 +13721,7 @@
             </a:r>
             <a:r>
               <a:rPr lang="da-DK" sz="2200" dirty="0"/>
-              <a:t>.)</a:t>
+              <a:t>.))</a:t>
             </a:r>
           </a:p>
           <a:p>
@@ -13727,13 +13786,13 @@
   <p:clrMapOvr>
     <a:masterClrMapping/>
   </p:clrMapOvr>
-  <mc:AlternateContent xmlns:mc="http://schemas.openxmlformats.org/markup-compatibility/2006">
-    <mc:Choice xmlns:p14="http://schemas.microsoft.com/office/powerpoint/2010/main" Requires="p14">
+  <mc:AlternateContent xmlns:mc="http://schemas.openxmlformats.org/markup-compatibility/2006" xmlns:p14="http://schemas.microsoft.com/office/powerpoint/2010/main">
+    <mc:Choice Requires="p14">
       <p:transition spd="med" p14:dur="700">
         <p:fade/>
       </p:transition>
     </mc:Choice>
-    <mc:Fallback>
+    <mc:Fallback xmlns="">
       <p:transition spd="med">
         <p:fade/>
       </p:transition>
@@ -14297,13 +14356,13 @@
   <p:clrMapOvr>
     <a:masterClrMapping/>
   </p:clrMapOvr>
-  <mc:AlternateContent xmlns:mc="http://schemas.openxmlformats.org/markup-compatibility/2006">
-    <mc:Choice xmlns:p14="http://schemas.microsoft.com/office/powerpoint/2010/main" Requires="p14">
+  <mc:AlternateContent xmlns:mc="http://schemas.openxmlformats.org/markup-compatibility/2006" xmlns:p14="http://schemas.microsoft.com/office/powerpoint/2010/main">
+    <mc:Choice Requires="p14">
       <p:transition spd="med" p14:dur="700">
         <p:fade/>
       </p:transition>
     </mc:Choice>
-    <mc:Fallback>
+    <mc:Fallback xmlns="">
       <p:transition spd="med">
         <p:fade/>
       </p:transition>
@@ -14823,13 +14882,13 @@
   <p:clrMapOvr>
     <a:masterClrMapping/>
   </p:clrMapOvr>
-  <mc:AlternateContent xmlns:mc="http://schemas.openxmlformats.org/markup-compatibility/2006">
-    <mc:Choice xmlns:p14="http://schemas.microsoft.com/office/powerpoint/2010/main" Requires="p14">
+  <mc:AlternateContent xmlns:mc="http://schemas.openxmlformats.org/markup-compatibility/2006" xmlns:p14="http://schemas.microsoft.com/office/powerpoint/2010/main">
+    <mc:Choice Requires="p14">
       <p:transition spd="med" p14:dur="700">
         <p:fade/>
       </p:transition>
     </mc:Choice>
-    <mc:Fallback>
+    <mc:Fallback xmlns="">
       <p:transition spd="med">
         <p:fade/>
       </p:transition>
@@ -15519,13 +15578,13 @@
   <p:clrMapOvr>
     <a:masterClrMapping/>
   </p:clrMapOvr>
-  <mc:AlternateContent xmlns:mc="http://schemas.openxmlformats.org/markup-compatibility/2006">
-    <mc:Choice xmlns:p14="http://schemas.microsoft.com/office/powerpoint/2010/main" Requires="p14">
+  <mc:AlternateContent xmlns:mc="http://schemas.openxmlformats.org/markup-compatibility/2006" xmlns:p14="http://schemas.microsoft.com/office/powerpoint/2010/main">
+    <mc:Choice Requires="p14">
       <p:transition spd="med" p14:dur="700">
         <p:fade/>
       </p:transition>
     </mc:Choice>
-    <mc:Fallback>
+    <mc:Fallback xmlns="">
       <p:transition spd="med">
         <p:fade/>
       </p:transition>
@@ -16037,13 +16096,13 @@
   <p:clrMapOvr>
     <a:masterClrMapping/>
   </p:clrMapOvr>
-  <mc:AlternateContent xmlns:mc="http://schemas.openxmlformats.org/markup-compatibility/2006">
-    <mc:Choice xmlns:p14="http://schemas.microsoft.com/office/powerpoint/2010/main" Requires="p14">
+  <mc:AlternateContent xmlns:mc="http://schemas.openxmlformats.org/markup-compatibility/2006" xmlns:p14="http://schemas.microsoft.com/office/powerpoint/2010/main">
+    <mc:Choice Requires="p14">
       <p:transition spd="med" p14:dur="700">
         <p:fade/>
       </p:transition>
     </mc:Choice>
-    <mc:Fallback>
+    <mc:Fallback xmlns="">
       <p:transition spd="med">
         <p:fade/>
       </p:transition>
@@ -16508,8 +16567,20 @@
           </a:p>
           <a:p>
             <a:r>
+              <a:rPr lang="da-DK" sz="2200" dirty="0" err="1"/>
+              <a:t>Two</a:t>
+            </a:r>
+            <a:r>
               <a:rPr lang="da-DK" sz="2200" dirty="0"/>
-              <a:t>To wires in, on wire out</a:t>
+              <a:t> wires in, </a:t>
+            </a:r>
+            <a:r>
+              <a:rPr lang="da-DK" sz="2200" dirty="0" err="1"/>
+              <a:t>one</a:t>
+            </a:r>
+            <a:r>
+              <a:rPr lang="da-DK" sz="2200" dirty="0"/>
+              <a:t> wire out</a:t>
             </a:r>
           </a:p>
           <a:p>
@@ -16607,13 +16678,13 @@
   <p:clrMapOvr>
     <a:masterClrMapping/>
   </p:clrMapOvr>
-  <mc:AlternateContent xmlns:mc="http://schemas.openxmlformats.org/markup-compatibility/2006">
-    <mc:Choice xmlns:p14="http://schemas.microsoft.com/office/powerpoint/2010/main" Requires="p14">
+  <mc:AlternateContent xmlns:mc="http://schemas.openxmlformats.org/markup-compatibility/2006" xmlns:p14="http://schemas.microsoft.com/office/powerpoint/2010/main">
+    <mc:Choice Requires="p14">
       <p:transition spd="med" p14:dur="700">
         <p:fade/>
       </p:transition>
     </mc:Choice>
-    <mc:Fallback>
+    <mc:Fallback xmlns="">
       <p:transition spd="med">
         <p:fade/>
       </p:transition>
@@ -17099,13 +17170,13 @@
   <p:clrMapOvr>
     <a:masterClrMapping/>
   </p:clrMapOvr>
-  <mc:AlternateContent xmlns:mc="http://schemas.openxmlformats.org/markup-compatibility/2006">
-    <mc:Choice xmlns:p14="http://schemas.microsoft.com/office/powerpoint/2010/main" Requires="p14">
+  <mc:AlternateContent xmlns:mc="http://schemas.openxmlformats.org/markup-compatibility/2006" xmlns:p14="http://schemas.microsoft.com/office/powerpoint/2010/main">
+    <mc:Choice Requires="p14">
       <p:transition spd="med" p14:dur="700">
         <p:fade/>
       </p:transition>
     </mc:Choice>
-    <mc:Fallback>
+    <mc:Fallback xmlns="">
       <p:transition spd="med">
         <p:fade/>
       </p:transition>
@@ -17748,7 +17819,7 @@
             <a:pPr lvl="1"/>
             <a:r>
               <a:rPr lang="da-DK" sz="2200" dirty="0"/>
-              <a:t>Return </a:t>
+              <a:t>Returns </a:t>
             </a:r>
             <a:r>
               <a:rPr lang="da-DK" sz="2200" dirty="0" err="1"/>
@@ -17756,15 +17827,7 @@
             </a:r>
             <a:r>
               <a:rPr lang="da-DK" sz="2200" dirty="0"/>
-              <a:t> </a:t>
-            </a:r>
-            <a:r>
-              <a:rPr lang="da-DK" sz="2200" dirty="0" err="1"/>
-              <a:t>boolean</a:t>
-            </a:r>
-            <a:r>
-              <a:rPr lang="da-DK" sz="2200" dirty="0"/>
-              <a:t> </a:t>
+              <a:t> boolean </a:t>
             </a:r>
             <a:r>
               <a:rPr lang="da-DK" sz="2200" dirty="0" err="1"/>
@@ -17837,13 +17900,13 @@
   <p:clrMapOvr>
     <a:masterClrMapping/>
   </p:clrMapOvr>
-  <mc:AlternateContent xmlns:mc="http://schemas.openxmlformats.org/markup-compatibility/2006">
-    <mc:Choice xmlns:p14="http://schemas.microsoft.com/office/powerpoint/2010/main" Requires="p14">
+  <mc:AlternateContent xmlns:mc="http://schemas.openxmlformats.org/markup-compatibility/2006" xmlns:p14="http://schemas.microsoft.com/office/powerpoint/2010/main">
+    <mc:Choice Requires="p14">
       <p:transition spd="med" p14:dur="700">
         <p:fade/>
       </p:transition>
     </mc:Choice>
-    <mc:Fallback>
+    <mc:Fallback xmlns="">
       <p:transition spd="med">
         <p:fade/>
       </p:transition>
@@ -18323,13 +18386,13 @@
   <p:clrMapOvr>
     <a:masterClrMapping/>
   </p:clrMapOvr>
-  <mc:AlternateContent xmlns:mc="http://schemas.openxmlformats.org/markup-compatibility/2006">
-    <mc:Choice xmlns:p14="http://schemas.microsoft.com/office/powerpoint/2010/main" Requires="p14">
+  <mc:AlternateContent xmlns:mc="http://schemas.openxmlformats.org/markup-compatibility/2006" xmlns:p14="http://schemas.microsoft.com/office/powerpoint/2010/main">
+    <mc:Choice Requires="p14">
       <p:transition spd="med" p14:dur="700">
         <p:fade/>
       </p:transition>
     </mc:Choice>
-    <mc:Fallback>
+    <mc:Fallback xmlns="">
       <p:transition spd="med">
         <p:fade/>
       </p:transition>
@@ -18810,13 +18873,13 @@
   <p:clrMapOvr>
     <a:masterClrMapping/>
   </p:clrMapOvr>
-  <mc:AlternateContent xmlns:mc="http://schemas.openxmlformats.org/markup-compatibility/2006">
-    <mc:Choice xmlns:p14="http://schemas.microsoft.com/office/powerpoint/2010/main" Requires="p14">
+  <mc:AlternateContent xmlns:mc="http://schemas.openxmlformats.org/markup-compatibility/2006" xmlns:p14="http://schemas.microsoft.com/office/powerpoint/2010/main">
+    <mc:Choice Requires="p14">
       <p:transition spd="med" p14:dur="700">
         <p:fade/>
       </p:transition>
     </mc:Choice>
-    <mc:Fallback>
+    <mc:Fallback xmlns="">
       <p:transition spd="med">
         <p:fade/>
       </p:transition>
@@ -19297,13 +19360,13 @@
   <p:clrMapOvr>
     <a:masterClrMapping/>
   </p:clrMapOvr>
-  <mc:AlternateContent xmlns:mc="http://schemas.openxmlformats.org/markup-compatibility/2006">
-    <mc:Choice xmlns:p14="http://schemas.microsoft.com/office/powerpoint/2010/main" Requires="p14">
+  <mc:AlternateContent xmlns:mc="http://schemas.openxmlformats.org/markup-compatibility/2006" xmlns:p14="http://schemas.microsoft.com/office/powerpoint/2010/main">
+    <mc:Choice Requires="p14">
       <p:transition spd="med" p14:dur="700">
         <p:fade/>
       </p:transition>
     </mc:Choice>
-    <mc:Fallback>
+    <mc:Fallback xmlns="">
       <p:transition spd="med">
         <p:fade/>
       </p:transition>

</xml_diff>